<commit_message>
Update the DRomics cheaat sheet
</commit_message>
<xml_diff>
--- a/powerpoints/DRomics.pptx
+++ b/powerpoints/DRomics.pptx
@@ -34,7 +34,7 @@
       </p:grpSpPr>
       <p:sp>
         <p:nvSpPr>
-          <p:cNvPr id="38" name="PlaceHolder 1"/>
+          <p:cNvPr id="36" name="PlaceHolder 1"/>
           <p:cNvSpPr>
             <a:spLocks noGrp="1"/>
           </p:cNvSpPr>
@@ -77,7 +77,7 @@
       </p:sp>
       <p:sp>
         <p:nvSpPr>
-          <p:cNvPr id="39" name="PlaceHolder 2"/>
+          <p:cNvPr id="37" name="PlaceHolder 2"/>
           <p:cNvSpPr>
             <a:spLocks noGrp="1"/>
           </p:cNvSpPr>
@@ -117,7 +117,7 @@
       </p:sp>
       <p:sp>
         <p:nvSpPr>
-          <p:cNvPr id="40" name="PlaceHolder 3"/>
+          <p:cNvPr id="38" name="PlaceHolder 3"/>
           <p:cNvSpPr>
             <a:spLocks noGrp="1"/>
           </p:cNvSpPr>
@@ -157,7 +157,7 @@
       </p:sp>
       <p:sp>
         <p:nvSpPr>
-          <p:cNvPr id="41" name="PlaceHolder 4"/>
+          <p:cNvPr id="39" name="PlaceHolder 4"/>
           <p:cNvSpPr>
             <a:spLocks noGrp="1"/>
           </p:cNvSpPr>
@@ -208,7 +208,7 @@
       </p:sp>
       <p:sp>
         <p:nvSpPr>
-          <p:cNvPr id="42" name="PlaceHolder 5"/>
+          <p:cNvPr id="40" name="PlaceHolder 5"/>
           <p:cNvSpPr>
             <a:spLocks noGrp="1"/>
           </p:cNvSpPr>
@@ -255,7 +255,7 @@
       </p:sp>
       <p:sp>
         <p:nvSpPr>
-          <p:cNvPr id="43" name="PlaceHolder 6"/>
+          <p:cNvPr id="41" name="PlaceHolder 6"/>
           <p:cNvSpPr>
             <a:spLocks noGrp="1"/>
           </p:cNvSpPr>
@@ -292,7 +292,7 @@
             <a:pPr algn="r">
               <a:buNone/>
             </a:pPr>
-            <a:fld id="{E2E8D9FD-C1D0-45A5-B647-D9FFF93BE65C}" type="slidenum">
+            <a:fld id="{B3586F80-5FA0-4A77-9A51-C99E0122FF78}" type="slidenum">
               <a:rPr b="0" lang="fr-FR" sz="1400" spc="-1" strike="noStrike">
                 <a:latin typeface="Times New Roman"/>
               </a:rPr>
@@ -329,7 +329,7 @@
       </p:grpSpPr>
       <p:sp>
         <p:nvSpPr>
-          <p:cNvPr id="87" name="PlaceHolder 1"/>
+          <p:cNvPr id="85" name="PlaceHolder 1"/>
           <p:cNvSpPr>
             <a:spLocks noGrp="1"/>
           </p:cNvSpPr>
@@ -340,19 +340,19 @@
         <p:spPr>
           <a:xfrm>
             <a:off x="1190520" y="1252440"/>
-            <a:ext cx="4506480" cy="3379320"/>
-          </a:xfrm>
-          <a:prstGeom prst="rect">
-            <a:avLst/>
-          </a:prstGeom>
-          <a:ln w="0">
-            <a:noFill/>
-          </a:ln>
-        </p:spPr>
-      </p:sp>
-      <p:sp>
-        <p:nvSpPr>
-          <p:cNvPr id="88" name="PlaceHolder 2"/>
+            <a:ext cx="4505760" cy="3378600"/>
+          </a:xfrm>
+          <a:prstGeom prst="rect">
+            <a:avLst/>
+          </a:prstGeom>
+          <a:ln w="0">
+            <a:noFill/>
+          </a:ln>
+        </p:spPr>
+      </p:sp>
+      <p:sp>
+        <p:nvSpPr>
+          <p:cNvPr id="86" name="PlaceHolder 2"/>
           <p:cNvSpPr>
             <a:spLocks noGrp="1"/>
           </p:cNvSpPr>
@@ -363,7 +363,7 @@
         <p:spPr>
           <a:xfrm>
             <a:off x="689040" y="4821480"/>
-            <a:ext cx="5509800" cy="3942720"/>
+            <a:ext cx="5509080" cy="3942000"/>
           </a:xfrm>
           <a:prstGeom prst="rect">
             <a:avLst/>
@@ -386,14 +386,14 @@
       </p:sp>
       <p:sp>
         <p:nvSpPr>
-          <p:cNvPr id="89" name="CustomShape 3"/>
+          <p:cNvPr id="87" name="CustomShape 3"/>
           <p:cNvSpPr/>
           <p:nvPr/>
         </p:nvSpPr>
         <p:spPr>
           <a:xfrm>
             <a:off x="3902760" y="9515880"/>
-            <a:ext cx="2983320" cy="500400"/>
+            <a:ext cx="2982600" cy="499680"/>
           </a:xfrm>
           <a:prstGeom prst="rect">
             <a:avLst/>
@@ -420,7 +420,7 @@
               </a:lnSpc>
               <a:buNone/>
             </a:pPr>
-            <a:fld id="{52B3A610-1DF6-4B29-B3B4-F385E3184E6A}" type="slidenum">
+            <a:fld id="{5D325FF7-CCC9-4203-94E1-FEDEF092C99B}" type="slidenum">
               <a:rPr b="0" lang="fr-FR" sz="1300" spc="-1" strike="noStrike">
                 <a:solidFill>
                   <a:srgbClr val="000000"/>
@@ -482,7 +482,7 @@
       </p:grpSpPr>
       <p:sp>
         <p:nvSpPr>
-          <p:cNvPr id="23" name="PlaceHolder 1"/>
+          <p:cNvPr id="21" name="PlaceHolder 1"/>
           <p:cNvSpPr>
             <a:spLocks noGrp="1"/>
           </p:cNvSpPr>
@@ -519,7 +519,7 @@
       </p:sp>
       <p:sp>
         <p:nvSpPr>
-          <p:cNvPr id="24" name="PlaceHolder 2"/>
+          <p:cNvPr id="22" name="PlaceHolder 2"/>
           <p:cNvSpPr>
             <a:spLocks noGrp="1"/>
           </p:cNvSpPr>
@@ -553,7 +553,7 @@
       </p:sp>
       <p:sp>
         <p:nvSpPr>
-          <p:cNvPr id="25" name="PlaceHolder 3"/>
+          <p:cNvPr id="23" name="PlaceHolder 3"/>
           <p:cNvSpPr>
             <a:spLocks noGrp="1"/>
           </p:cNvSpPr>
@@ -609,7 +609,7 @@
       </p:grpSpPr>
       <p:sp>
         <p:nvSpPr>
-          <p:cNvPr id="26" name="PlaceHolder 1"/>
+          <p:cNvPr id="24" name="PlaceHolder 1"/>
           <p:cNvSpPr>
             <a:spLocks noGrp="1"/>
           </p:cNvSpPr>
@@ -646,7 +646,7 @@
       </p:sp>
       <p:sp>
         <p:nvSpPr>
-          <p:cNvPr id="27" name="PlaceHolder 2"/>
+          <p:cNvPr id="25" name="PlaceHolder 2"/>
           <p:cNvSpPr>
             <a:spLocks noGrp="1"/>
           </p:cNvSpPr>
@@ -680,7 +680,7 @@
       </p:sp>
       <p:sp>
         <p:nvSpPr>
-          <p:cNvPr id="28" name="PlaceHolder 3"/>
+          <p:cNvPr id="26" name="PlaceHolder 3"/>
           <p:cNvSpPr>
             <a:spLocks noGrp="1"/>
           </p:cNvSpPr>
@@ -714,7 +714,7 @@
       </p:sp>
       <p:sp>
         <p:nvSpPr>
-          <p:cNvPr id="29" name="PlaceHolder 4"/>
+          <p:cNvPr id="27" name="PlaceHolder 4"/>
           <p:cNvSpPr>
             <a:spLocks noGrp="1"/>
           </p:cNvSpPr>
@@ -748,7 +748,7 @@
       </p:sp>
       <p:sp>
         <p:nvSpPr>
-          <p:cNvPr id="30" name="PlaceHolder 5"/>
+          <p:cNvPr id="28" name="PlaceHolder 5"/>
           <p:cNvSpPr>
             <a:spLocks noGrp="1"/>
           </p:cNvSpPr>
@@ -804,7 +804,7 @@
       </p:grpSpPr>
       <p:sp>
         <p:nvSpPr>
-          <p:cNvPr id="31" name="PlaceHolder 1"/>
+          <p:cNvPr id="29" name="PlaceHolder 1"/>
           <p:cNvSpPr>
             <a:spLocks noGrp="1"/>
           </p:cNvSpPr>
@@ -841,7 +841,7 @@
       </p:sp>
       <p:sp>
         <p:nvSpPr>
-          <p:cNvPr id="32" name="PlaceHolder 2"/>
+          <p:cNvPr id="30" name="PlaceHolder 2"/>
           <p:cNvSpPr>
             <a:spLocks noGrp="1"/>
           </p:cNvSpPr>
@@ -875,7 +875,7 @@
       </p:sp>
       <p:sp>
         <p:nvSpPr>
-          <p:cNvPr id="33" name="PlaceHolder 3"/>
+          <p:cNvPr id="31" name="PlaceHolder 3"/>
           <p:cNvSpPr>
             <a:spLocks noGrp="1"/>
           </p:cNvSpPr>
@@ -909,7 +909,7 @@
       </p:sp>
       <p:sp>
         <p:nvSpPr>
-          <p:cNvPr id="34" name="PlaceHolder 4"/>
+          <p:cNvPr id="32" name="PlaceHolder 4"/>
           <p:cNvSpPr>
             <a:spLocks noGrp="1"/>
           </p:cNvSpPr>
@@ -943,7 +943,7 @@
       </p:sp>
       <p:sp>
         <p:nvSpPr>
-          <p:cNvPr id="35" name="PlaceHolder 5"/>
+          <p:cNvPr id="33" name="PlaceHolder 5"/>
           <p:cNvSpPr>
             <a:spLocks noGrp="1"/>
           </p:cNvSpPr>
@@ -977,7 +977,7 @@
       </p:sp>
       <p:sp>
         <p:nvSpPr>
-          <p:cNvPr id="36" name="PlaceHolder 6"/>
+          <p:cNvPr id="34" name="PlaceHolder 6"/>
           <p:cNvSpPr>
             <a:spLocks noGrp="1"/>
           </p:cNvSpPr>
@@ -1011,7 +1011,7 @@
       </p:sp>
       <p:sp>
         <p:nvSpPr>
-          <p:cNvPr id="37" name="PlaceHolder 7"/>
+          <p:cNvPr id="35" name="PlaceHolder 7"/>
           <p:cNvSpPr>
             <a:spLocks noGrp="1"/>
           </p:cNvSpPr>
@@ -1067,7 +1067,7 @@
       </p:grpSpPr>
       <p:sp>
         <p:nvSpPr>
-          <p:cNvPr id="2" name="PlaceHolder 1"/>
+          <p:cNvPr id="0" name="PlaceHolder 1"/>
           <p:cNvSpPr>
             <a:spLocks noGrp="1"/>
           </p:cNvSpPr>
@@ -1104,7 +1104,7 @@
       </p:sp>
       <p:sp>
         <p:nvSpPr>
-          <p:cNvPr id="3" name="PlaceHolder 2"/>
+          <p:cNvPr id="1" name="PlaceHolder 2"/>
           <p:cNvSpPr>
             <a:spLocks noGrp="1"/>
           </p:cNvSpPr>
@@ -1163,7 +1163,7 @@
       </p:grpSpPr>
       <p:sp>
         <p:nvSpPr>
-          <p:cNvPr id="4" name="PlaceHolder 1"/>
+          <p:cNvPr id="2" name="PlaceHolder 1"/>
           <p:cNvSpPr>
             <a:spLocks noGrp="1"/>
           </p:cNvSpPr>
@@ -1200,7 +1200,7 @@
       </p:sp>
       <p:sp>
         <p:nvSpPr>
-          <p:cNvPr id="5" name="PlaceHolder 2"/>
+          <p:cNvPr id="3" name="PlaceHolder 2"/>
           <p:cNvSpPr>
             <a:spLocks noGrp="1"/>
           </p:cNvSpPr>
@@ -1256,7 +1256,7 @@
       </p:grpSpPr>
       <p:sp>
         <p:nvSpPr>
-          <p:cNvPr id="6" name="PlaceHolder 1"/>
+          <p:cNvPr id="4" name="PlaceHolder 1"/>
           <p:cNvSpPr>
             <a:spLocks noGrp="1"/>
           </p:cNvSpPr>
@@ -1293,7 +1293,7 @@
       </p:sp>
       <p:sp>
         <p:nvSpPr>
-          <p:cNvPr id="7" name="PlaceHolder 2"/>
+          <p:cNvPr id="5" name="PlaceHolder 2"/>
           <p:cNvSpPr>
             <a:spLocks noGrp="1"/>
           </p:cNvSpPr>
@@ -1327,7 +1327,7 @@
       </p:sp>
       <p:sp>
         <p:nvSpPr>
-          <p:cNvPr id="8" name="PlaceHolder 3"/>
+          <p:cNvPr id="6" name="PlaceHolder 3"/>
           <p:cNvSpPr>
             <a:spLocks noGrp="1"/>
           </p:cNvSpPr>
@@ -1383,7 +1383,7 @@
       </p:grpSpPr>
       <p:sp>
         <p:nvSpPr>
-          <p:cNvPr id="9" name="PlaceHolder 1"/>
+          <p:cNvPr id="7" name="PlaceHolder 1"/>
           <p:cNvSpPr>
             <a:spLocks noGrp="1"/>
           </p:cNvSpPr>
@@ -1442,7 +1442,7 @@
       </p:grpSpPr>
       <p:sp>
         <p:nvSpPr>
-          <p:cNvPr id="10" name="PlaceHolder 1"/>
+          <p:cNvPr id="8" name="PlaceHolder 1"/>
           <p:cNvSpPr>
             <a:spLocks noGrp="1"/>
           </p:cNvSpPr>
@@ -1501,7 +1501,7 @@
       </p:grpSpPr>
       <p:sp>
         <p:nvSpPr>
-          <p:cNvPr id="11" name="PlaceHolder 1"/>
+          <p:cNvPr id="9" name="PlaceHolder 1"/>
           <p:cNvSpPr>
             <a:spLocks noGrp="1"/>
           </p:cNvSpPr>
@@ -1538,7 +1538,7 @@
       </p:sp>
       <p:sp>
         <p:nvSpPr>
-          <p:cNvPr id="12" name="PlaceHolder 2"/>
+          <p:cNvPr id="10" name="PlaceHolder 2"/>
           <p:cNvSpPr>
             <a:spLocks noGrp="1"/>
           </p:cNvSpPr>
@@ -1572,7 +1572,7 @@
       </p:sp>
       <p:sp>
         <p:nvSpPr>
-          <p:cNvPr id="13" name="PlaceHolder 3"/>
+          <p:cNvPr id="11" name="PlaceHolder 3"/>
           <p:cNvSpPr>
             <a:spLocks noGrp="1"/>
           </p:cNvSpPr>
@@ -1606,7 +1606,7 @@
       </p:sp>
       <p:sp>
         <p:nvSpPr>
-          <p:cNvPr id="14" name="PlaceHolder 4"/>
+          <p:cNvPr id="12" name="PlaceHolder 4"/>
           <p:cNvSpPr>
             <a:spLocks noGrp="1"/>
           </p:cNvSpPr>
@@ -1662,7 +1662,7 @@
       </p:grpSpPr>
       <p:sp>
         <p:nvSpPr>
-          <p:cNvPr id="15" name="PlaceHolder 1"/>
+          <p:cNvPr id="13" name="PlaceHolder 1"/>
           <p:cNvSpPr>
             <a:spLocks noGrp="1"/>
           </p:cNvSpPr>
@@ -1699,7 +1699,7 @@
       </p:sp>
       <p:sp>
         <p:nvSpPr>
-          <p:cNvPr id="16" name="PlaceHolder 2"/>
+          <p:cNvPr id="14" name="PlaceHolder 2"/>
           <p:cNvSpPr>
             <a:spLocks noGrp="1"/>
           </p:cNvSpPr>
@@ -1733,7 +1733,7 @@
       </p:sp>
       <p:sp>
         <p:nvSpPr>
-          <p:cNvPr id="17" name="PlaceHolder 3"/>
+          <p:cNvPr id="15" name="PlaceHolder 3"/>
           <p:cNvSpPr>
             <a:spLocks noGrp="1"/>
           </p:cNvSpPr>
@@ -1767,7 +1767,7 @@
       </p:sp>
       <p:sp>
         <p:nvSpPr>
-          <p:cNvPr id="18" name="PlaceHolder 4"/>
+          <p:cNvPr id="16" name="PlaceHolder 4"/>
           <p:cNvSpPr>
             <a:spLocks noGrp="1"/>
           </p:cNvSpPr>
@@ -1823,7 +1823,7 @@
       </p:grpSpPr>
       <p:sp>
         <p:nvSpPr>
-          <p:cNvPr id="19" name="PlaceHolder 1"/>
+          <p:cNvPr id="17" name="PlaceHolder 1"/>
           <p:cNvSpPr>
             <a:spLocks noGrp="1"/>
           </p:cNvSpPr>
@@ -1860,7 +1860,7 @@
       </p:sp>
       <p:sp>
         <p:nvSpPr>
-          <p:cNvPr id="20" name="PlaceHolder 2"/>
+          <p:cNvPr id="18" name="PlaceHolder 2"/>
           <p:cNvSpPr>
             <a:spLocks noGrp="1"/>
           </p:cNvSpPr>
@@ -1894,7 +1894,7 @@
       </p:sp>
       <p:sp>
         <p:nvSpPr>
-          <p:cNvPr id="21" name="PlaceHolder 3"/>
+          <p:cNvPr id="19" name="PlaceHolder 3"/>
           <p:cNvSpPr>
             <a:spLocks noGrp="1"/>
           </p:cNvSpPr>
@@ -1928,7 +1928,7 @@
       </p:sp>
       <p:sp>
         <p:nvSpPr>
-          <p:cNvPr id="22" name="PlaceHolder 4"/>
+          <p:cNvPr id="20" name="PlaceHolder 4"/>
           <p:cNvSpPr>
             <a:spLocks noGrp="1"/>
           </p:cNvSpPr>
@@ -1989,232 +1989,6 @@
           <a:chExt cx="0" cy="0"/>
         </a:xfrm>
       </p:grpSpPr>
-      <p:sp>
-        <p:nvSpPr>
-          <p:cNvPr id="0" name="PlaceHolder 1"/>
-          <p:cNvSpPr>
-            <a:spLocks noGrp="1"/>
-          </p:cNvSpPr>
-          <p:nvPr>
-            <p:ph type="title"/>
-          </p:nvPr>
-        </p:nvSpPr>
-        <p:spPr>
-          <a:xfrm>
-            <a:off x="457200" y="273600"/>
-            <a:ext cx="8229240" cy="1144800"/>
-          </a:xfrm>
-          <a:prstGeom prst="rect">
-            <a:avLst/>
-          </a:prstGeom>
-          <a:noFill/>
-          <a:ln w="0">
-            <a:noFill/>
-          </a:ln>
-        </p:spPr>
-        <p:txBody>
-          <a:bodyPr lIns="0" rIns="0" tIns="0" bIns="0" anchor="ctr">
-            <a:noAutofit/>
-          </a:bodyPr>
-          <a:p>
-            <a:pPr algn="ctr">
-              <a:buNone/>
-            </a:pPr>
-            <a:r>
-              <a:rPr b="0" lang="fr-FR" sz="4400" spc="-1" strike="noStrike">
-                <a:latin typeface="Arial"/>
-              </a:rPr>
-              <a:t>Cliquez pour éditer le format du texte-titre</a:t>
-            </a:r>
-            <a:endParaRPr b="0" lang="fr-FR" sz="4400" spc="-1" strike="noStrike">
-              <a:latin typeface="Arial"/>
-            </a:endParaRPr>
-          </a:p>
-        </p:txBody>
-      </p:sp>
-      <p:sp>
-        <p:nvSpPr>
-          <p:cNvPr id="1" name="PlaceHolder 2"/>
-          <p:cNvSpPr>
-            <a:spLocks noGrp="1"/>
-          </p:cNvSpPr>
-          <p:nvPr>
-            <p:ph type="body"/>
-          </p:nvPr>
-        </p:nvSpPr>
-        <p:spPr>
-          <a:xfrm>
-            <a:off x="457200" y="1604520"/>
-            <a:ext cx="8229240" cy="3977280"/>
-          </a:xfrm>
-          <a:prstGeom prst="rect">
-            <a:avLst/>
-          </a:prstGeom>
-          <a:noFill/>
-          <a:ln w="0">
-            <a:noFill/>
-          </a:ln>
-        </p:spPr>
-        <p:txBody>
-          <a:bodyPr lIns="0" rIns="0" tIns="0" bIns="0" anchor="t">
-            <a:normAutofit/>
-          </a:bodyPr>
-          <a:p>
-            <a:pPr marL="432000" indent="-324000">
-              <a:spcBef>
-                <a:spcPts val="1417"/>
-              </a:spcBef>
-              <a:buClr>
-                <a:srgbClr val="000000"/>
-              </a:buClr>
-              <a:buSzPct val="45000"/>
-              <a:buFont typeface="Wingdings" charset="2"/>
-              <a:buChar char=""/>
-            </a:pPr>
-            <a:r>
-              <a:rPr b="0" lang="fr-FR" sz="3200" spc="-1" strike="noStrike">
-                <a:latin typeface="Arial"/>
-              </a:rPr>
-              <a:t>Cliquez pour éditer le format du plan de texte</a:t>
-            </a:r>
-            <a:endParaRPr b="0" lang="fr-FR" sz="3200" spc="-1" strike="noStrike">
-              <a:latin typeface="Arial"/>
-            </a:endParaRPr>
-          </a:p>
-          <a:p>
-            <a:pPr lvl="1" marL="864000" indent="-324000">
-              <a:spcBef>
-                <a:spcPts val="1134"/>
-              </a:spcBef>
-              <a:buClr>
-                <a:srgbClr val="000000"/>
-              </a:buClr>
-              <a:buSzPct val="75000"/>
-              <a:buFont typeface="Symbol" charset="2"/>
-              <a:buChar char=""/>
-            </a:pPr>
-            <a:r>
-              <a:rPr b="0" lang="fr-FR" sz="2800" spc="-1" strike="noStrike">
-                <a:latin typeface="Arial"/>
-              </a:rPr>
-              <a:t>Second niveau de plan</a:t>
-            </a:r>
-            <a:endParaRPr b="0" lang="fr-FR" sz="2800" spc="-1" strike="noStrike">
-              <a:latin typeface="Arial"/>
-            </a:endParaRPr>
-          </a:p>
-          <a:p>
-            <a:pPr lvl="2" marL="1296000" indent="-288000">
-              <a:spcBef>
-                <a:spcPts val="850"/>
-              </a:spcBef>
-              <a:buClr>
-                <a:srgbClr val="000000"/>
-              </a:buClr>
-              <a:buSzPct val="45000"/>
-              <a:buFont typeface="Wingdings" charset="2"/>
-              <a:buChar char=""/>
-            </a:pPr>
-            <a:r>
-              <a:rPr b="0" lang="fr-FR" sz="2400" spc="-1" strike="noStrike">
-                <a:latin typeface="Arial"/>
-              </a:rPr>
-              <a:t>Troisième niveau de plan</a:t>
-            </a:r>
-            <a:endParaRPr b="0" lang="fr-FR" sz="2400" spc="-1" strike="noStrike">
-              <a:latin typeface="Arial"/>
-            </a:endParaRPr>
-          </a:p>
-          <a:p>
-            <a:pPr lvl="3" marL="1728000" indent="-216000">
-              <a:spcBef>
-                <a:spcPts val="567"/>
-              </a:spcBef>
-              <a:buClr>
-                <a:srgbClr val="000000"/>
-              </a:buClr>
-              <a:buSzPct val="75000"/>
-              <a:buFont typeface="Symbol" charset="2"/>
-              <a:buChar char=""/>
-            </a:pPr>
-            <a:r>
-              <a:rPr b="0" lang="fr-FR" sz="2000" spc="-1" strike="noStrike">
-                <a:latin typeface="Arial"/>
-              </a:rPr>
-              <a:t>Quatrième niveau de plan</a:t>
-            </a:r>
-            <a:endParaRPr b="0" lang="fr-FR" sz="2000" spc="-1" strike="noStrike">
-              <a:latin typeface="Arial"/>
-            </a:endParaRPr>
-          </a:p>
-          <a:p>
-            <a:pPr lvl="4" marL="2160000" indent="-216000">
-              <a:spcBef>
-                <a:spcPts val="283"/>
-              </a:spcBef>
-              <a:buClr>
-                <a:srgbClr val="000000"/>
-              </a:buClr>
-              <a:buSzPct val="45000"/>
-              <a:buFont typeface="Wingdings" charset="2"/>
-              <a:buChar char=""/>
-            </a:pPr>
-            <a:r>
-              <a:rPr b="0" lang="fr-FR" sz="2000" spc="-1" strike="noStrike">
-                <a:latin typeface="Arial"/>
-              </a:rPr>
-              <a:t>Cinquième niveau de plan</a:t>
-            </a:r>
-            <a:endParaRPr b="0" lang="fr-FR" sz="2000" spc="-1" strike="noStrike">
-              <a:latin typeface="Arial"/>
-            </a:endParaRPr>
-          </a:p>
-          <a:p>
-            <a:pPr lvl="5" marL="2592000" indent="-216000">
-              <a:spcBef>
-                <a:spcPts val="283"/>
-              </a:spcBef>
-              <a:buClr>
-                <a:srgbClr val="000000"/>
-              </a:buClr>
-              <a:buSzPct val="45000"/>
-              <a:buFont typeface="Wingdings" charset="2"/>
-              <a:buChar char=""/>
-            </a:pPr>
-            <a:r>
-              <a:rPr b="0" lang="fr-FR" sz="2000" spc="-1" strike="noStrike">
-                <a:latin typeface="Arial"/>
-              </a:rPr>
-              <a:t>Sixième niveau de plan</a:t>
-            </a:r>
-            <a:endParaRPr b="0" lang="fr-FR" sz="2000" spc="-1" strike="noStrike">
-              <a:latin typeface="Arial"/>
-            </a:endParaRPr>
-          </a:p>
-          <a:p>
-            <a:pPr lvl="6" marL="3024000" indent="-216000">
-              <a:spcBef>
-                <a:spcPts val="283"/>
-              </a:spcBef>
-              <a:buClr>
-                <a:srgbClr val="000000"/>
-              </a:buClr>
-              <a:buSzPct val="45000"/>
-              <a:buFont typeface="Wingdings" charset="2"/>
-              <a:buChar char=""/>
-            </a:pPr>
-            <a:r>
-              <a:rPr b="0" lang="fr-FR" sz="2000" spc="-1" strike="noStrike">
-                <a:latin typeface="Arial"/>
-              </a:rPr>
-              <a:t>Septième niveau de plan</a:t>
-            </a:r>
-            <a:endParaRPr b="0" lang="fr-FR" sz="2000" spc="-1" strike="noStrike">
-              <a:latin typeface="Arial"/>
-            </a:endParaRPr>
-          </a:p>
-        </p:txBody>
-      </p:sp>
     </p:spTree>
   </p:cSld>
   <p:clrMap bg1="lt1" bg2="lt2" tx1="dk1" tx2="dk2" accent1="accent1" accent2="accent2" accent3="accent3" accent4="accent4" accent5="accent5" accent6="accent6" hlink="hlink" folHlink="folHlink"/>
@@ -2252,62 +2026,16 @@
           <a:chExt cx="0" cy="0"/>
         </a:xfrm>
       </p:grpSpPr>
-      <p:pic>
-        <p:nvPicPr>
-          <p:cNvPr id="44" name="Image 55" descr=""/>
-          <p:cNvPicPr/>
-          <p:nvPr/>
-        </p:nvPicPr>
-        <p:blipFill>
-          <a:blip r:embed="rId1"/>
-          <a:stretch/>
-        </p:blipFill>
-        <p:spPr>
-          <a:xfrm>
-            <a:off x="6876000" y="3552480"/>
-            <a:ext cx="2231280" cy="1266480"/>
-          </a:xfrm>
-          <a:prstGeom prst="rect">
-            <a:avLst/>
-          </a:prstGeom>
-          <a:ln w="0">
-            <a:noFill/>
-          </a:ln>
-        </p:spPr>
-      </p:pic>
-      <p:pic>
-        <p:nvPicPr>
-          <p:cNvPr id="45" name="Image 43" descr=""/>
-          <p:cNvPicPr/>
-          <p:nvPr/>
-        </p:nvPicPr>
-        <p:blipFill>
-          <a:blip r:embed="rId2"/>
-          <a:stretch/>
-        </p:blipFill>
-        <p:spPr>
-          <a:xfrm>
-            <a:off x="6876000" y="5659200"/>
-            <a:ext cx="2231280" cy="1108080"/>
-          </a:xfrm>
-          <a:prstGeom prst="rect">
-            <a:avLst/>
-          </a:prstGeom>
-          <a:ln w="0">
-            <a:noFill/>
-          </a:ln>
-        </p:spPr>
-      </p:pic>
-      <p:sp>
-        <p:nvSpPr>
-          <p:cNvPr id="46" name="CustomShape 1"/>
+      <p:sp>
+        <p:nvSpPr>
+          <p:cNvPr id="42" name="CustomShape 1"/>
           <p:cNvSpPr/>
           <p:nvPr/>
         </p:nvSpPr>
         <p:spPr>
           <a:xfrm>
             <a:off x="1440000" y="83880"/>
-            <a:ext cx="2986560" cy="455400"/>
+            <a:ext cx="2985840" cy="455400"/>
           </a:xfrm>
           <a:prstGeom prst="rect">
             <a:avLst/>
@@ -2382,14 +2110,14 @@
       </p:sp>
       <p:sp>
         <p:nvSpPr>
-          <p:cNvPr id="47" name="CustomShape 2"/>
+          <p:cNvPr id="43" name="CustomShape 2"/>
           <p:cNvSpPr/>
           <p:nvPr/>
         </p:nvSpPr>
         <p:spPr>
           <a:xfrm>
-            <a:off x="1836000" y="5976360"/>
-            <a:ext cx="2698560" cy="698040"/>
+            <a:off x="1836000" y="5940360"/>
+            <a:ext cx="2697840" cy="515880"/>
           </a:xfrm>
           <a:prstGeom prst="rect">
             <a:avLst/>
@@ -2417,7 +2145,7 @@
               <a:buNone/>
             </a:pPr>
             <a:r>
-              <a:rPr b="0" lang="fr-FR" sz="800" spc="-1" strike="noStrike">
+              <a:rPr b="0" lang="fr-FR" sz="700" spc="-1" strike="noStrike">
                 <a:solidFill>
                   <a:srgbClr val="000000"/>
                 </a:solidFill>
@@ -2437,7 +2165,7 @@
               <a:t>print()</a:t>
             </a:r>
             <a:r>
-              <a:rPr b="0" lang="fr-FR" sz="800" spc="-1" strike="noStrike">
+              <a:rPr b="0" lang="fr-FR" sz="700" spc="-1" strike="noStrike">
                 <a:solidFill>
                   <a:srgbClr val="000000"/>
                 </a:solidFill>
@@ -2457,7 +2185,7 @@
               <a:t>plot()</a:t>
             </a:r>
             <a:r>
-              <a:rPr b="0" lang="fr-FR" sz="800" spc="-1" strike="noStrike">
+              <a:rPr b="0" lang="fr-FR" sz="700" spc="-1" strike="noStrike">
                 <a:solidFill>
                   <a:srgbClr val="000000"/>
                 </a:solidFill>
@@ -2466,7 +2194,7 @@
               </a:rPr>
               <a:t> functions.</a:t>
             </a:r>
-            <a:endParaRPr b="0" lang="fr-FR" sz="800" spc="-1" strike="noStrike">
+            <a:endParaRPr b="0" lang="fr-FR" sz="700" spc="-1" strike="noStrike">
               <a:latin typeface="Arial"/>
             </a:endParaRPr>
           </a:p>
@@ -2478,7 +2206,7 @@
               <a:buNone/>
             </a:pPr>
             <a:r>
-              <a:rPr b="0" lang="fr-FR" sz="800" spc="-1" strike="noStrike">
+              <a:rPr b="0" lang="fr-FR" sz="700" spc="-1" strike="noStrike">
                 <a:solidFill>
                   <a:srgbClr val="000000"/>
                 </a:solidFill>
@@ -2515,14 +2243,14 @@
       </p:sp>
       <p:sp>
         <p:nvSpPr>
-          <p:cNvPr id="48" name="CustomShape 3"/>
+          <p:cNvPr id="44" name="CustomShape 3"/>
           <p:cNvSpPr/>
           <p:nvPr/>
         </p:nvSpPr>
         <p:spPr>
           <a:xfrm>
             <a:off x="4572000" y="2592000"/>
-            <a:ext cx="2231280" cy="515880"/>
+            <a:ext cx="2230560" cy="515880"/>
           </a:xfrm>
           <a:prstGeom prst="rect">
             <a:avLst/>
@@ -2567,14 +2295,14 @@
       </p:sp>
       <p:sp>
         <p:nvSpPr>
-          <p:cNvPr id="49" name="CustomShape 4"/>
+          <p:cNvPr id="45" name="CustomShape 4"/>
           <p:cNvSpPr/>
           <p:nvPr/>
         </p:nvSpPr>
         <p:spPr>
           <a:xfrm>
             <a:off x="6876000" y="2988000"/>
-            <a:ext cx="2231280" cy="409320"/>
+            <a:ext cx="2230560" cy="409320"/>
           </a:xfrm>
           <a:prstGeom prst="rect">
             <a:avLst/>
@@ -2609,7 +2337,7 @@
                 <a:latin typeface="Lucida Console"/>
                 <a:ea typeface="DejaVu Sans"/>
               </a:rPr>
-              <a:t>curvesplot(extendedres, xmin, xmax,      scaling, facetby, facetby2, colorby,   line.size, dose_log_transfo = FALSE)</a:t>
+              <a:t>curvesplot(extendedres, xmin, xmax,      scaling, facetby, facetby2, colorby,   line.size, dose_log_transfo, addBMD)</a:t>
             </a:r>
             <a:endParaRPr b="0" lang="fr-FR" sz="700" spc="-1" strike="noStrike">
               <a:latin typeface="Arial"/>
@@ -2619,14 +2347,14 @@
       </p:sp>
       <p:sp>
         <p:nvSpPr>
-          <p:cNvPr id="50" name="CustomShape 5"/>
+          <p:cNvPr id="46" name="CustomShape 5"/>
           <p:cNvSpPr/>
           <p:nvPr/>
         </p:nvSpPr>
         <p:spPr>
           <a:xfrm>
             <a:off x="4644000" y="576000"/>
-            <a:ext cx="4390560" cy="819720"/>
+            <a:ext cx="4389840" cy="835560"/>
           </a:xfrm>
           <a:prstGeom prst="rect">
             <a:avLst/>
@@ -2654,7 +2382,7 @@
               <a:buNone/>
             </a:pPr>
             <a:r>
-              <a:rPr b="0" lang="fr-FR" sz="800" spc="-1" strike="noStrike">
+              <a:rPr b="0" lang="fr-FR" sz="700" spc="-1" strike="noStrike">
                 <a:solidFill>
                   <a:srgbClr val="000000"/>
                 </a:solidFill>
@@ -2674,7 +2402,7 @@
               <a:t>extendedres</a:t>
             </a:r>
             <a:r>
-              <a:rPr b="0" lang="fr-FR" sz="800" spc="-1" strike="noStrike">
+              <a:rPr b="0" lang="fr-FR" sz="700" spc="-1" strike="noStrike">
                 <a:solidFill>
                   <a:srgbClr val="000000"/>
                 </a:solidFill>
@@ -2684,41 +2412,81 @@
               <a:t>, a </a:t>
             </a:r>
             <a:r>
-              <a:rPr b="0" lang="en-US" sz="800" spc="-1" strike="noStrike">
+              <a:rPr b="0" lang="en-US" sz="700" spc="-1" strike="noStrike">
                 <a:solidFill>
                   <a:srgbClr val="000000"/>
                 </a:solidFill>
                 <a:latin typeface="Barlow"/>
                 <a:ea typeface="DejaVu Sans"/>
               </a:rPr>
-              <a:t>dataframe with the main workflow results, optionally gathering results obtained at different experimental (different molecular levels, different time points, different pre-exposure histories, …) extended with additional columns coding for the biological annotation of items and optionally for the experimental level. Some lines of the workflow results can be replicated for items having more than one annotation. S</a:t>
-            </a:r>
-            <a:r>
-              <a:rPr b="0" lang="fr-FR" sz="800" spc="-1" strike="noStrike">
+              <a:t>dataframe with the main workflow results, optionally gathering results obtained at different experimental (different molecular levels, different time points, different pre-exposure histories, …) extended with additional columns coding for the biological annotation of items and optionally for the experimental level. Some lines of the workflow results can be replicated for items having more than one annotation. The </a:t>
+            </a:r>
+            <a:r>
+              <a:rPr b="0" lang="fr-FR" sz="700" spc="-1" strike="noStrike">
+                <a:solidFill>
+                  <a:srgbClr val="000000"/>
+                </a:solidFill>
+                <a:latin typeface="Lucida Console"/>
+                <a:ea typeface="DejaVu Sans"/>
+              </a:rPr>
+              <a:t>selectgroups()</a:t>
+            </a:r>
+            <a:r>
+              <a:rPr b="0" lang="en-US" sz="700" spc="-1" strike="noStrike">
                 <a:solidFill>
                   <a:srgbClr val="000000"/>
                 </a:solidFill>
                 <a:latin typeface="Barlow"/>
                 <a:ea typeface="DejaVu Sans"/>
               </a:rPr>
-              <a:t>ee help pages for a complete description of argument of those functions.</a:t>
-            </a:r>
-            <a:endParaRPr b="0" lang="fr-FR" sz="800" spc="-1" strike="noStrike">
-              <a:latin typeface="Arial"/>
-            </a:endParaRPr>
-          </a:p>
-        </p:txBody>
-      </p:sp>
-      <p:sp>
-        <p:nvSpPr>
-          <p:cNvPr id="51" name="CustomShape 6"/>
+              <a:t> and </a:t>
+            </a:r>
+            <a:r>
+              <a:rPr b="0" lang="fr-FR" sz="700" spc="-1" strike="noStrike">
+                <a:solidFill>
+                  <a:srgbClr val="000000"/>
+                </a:solidFill>
+                <a:latin typeface="Lucida Console"/>
+                <a:ea typeface="DejaVu Sans"/>
+              </a:rPr>
+              <a:t>bmdfilter()</a:t>
+            </a:r>
+            <a:r>
+              <a:rPr b="0" lang="en-US" sz="700" spc="-1" strike="noStrike">
+                <a:solidFill>
+                  <a:srgbClr val="000000"/>
+                </a:solidFill>
+                <a:latin typeface="Barlow"/>
+                <a:ea typeface="DejaVu Sans"/>
+              </a:rPr>
+              <a:t> functions can be used to focus on groups or items before producing the plot. S</a:t>
+            </a:r>
+            <a:r>
+              <a:rPr b="0" lang="fr-FR" sz="700" spc="-1" strike="noStrike">
+                <a:solidFill>
+                  <a:srgbClr val="000000"/>
+                </a:solidFill>
+                <a:latin typeface="Barlow"/>
+                <a:ea typeface="DejaVu Sans"/>
+              </a:rPr>
+              <a:t>ee help pages for a complete description of functions illustrated below.</a:t>
+            </a:r>
+            <a:endParaRPr b="0" lang="fr-FR" sz="700" spc="-1" strike="noStrike">
+              <a:latin typeface="Arial"/>
+            </a:endParaRPr>
+          </a:p>
+        </p:txBody>
+      </p:sp>
+      <p:sp>
+        <p:nvSpPr>
+          <p:cNvPr id="47" name="CustomShape 6"/>
           <p:cNvSpPr/>
           <p:nvPr/>
         </p:nvSpPr>
         <p:spPr>
           <a:xfrm>
             <a:off x="1440000" y="488880"/>
-            <a:ext cx="3094560" cy="409320"/>
+            <a:ext cx="3093840" cy="409320"/>
           </a:xfrm>
           <a:prstGeom prst="rect">
             <a:avLst/>
@@ -2753,7 +2521,7 @@
                 <a:latin typeface="Barlow"/>
                 <a:ea typeface="DejaVu Sans"/>
               </a:rPr>
-              <a:t>Written by the authors of the DRomics package - Updated in january 2023</a:t>
+              <a:t>Written by the authors of the DRomics package - Updated in june 2024</a:t>
             </a:r>
             <a:endParaRPr b="0" lang="fr-FR" sz="700" spc="-1" strike="noStrike">
               <a:latin typeface="Arial"/>
@@ -2815,14 +2583,14 @@
       </p:sp>
       <p:sp>
         <p:nvSpPr>
-          <p:cNvPr id="52" name="CustomShape 7"/>
+          <p:cNvPr id="48" name="CustomShape 7"/>
           <p:cNvSpPr/>
           <p:nvPr/>
         </p:nvSpPr>
         <p:spPr>
           <a:xfrm>
             <a:off x="4572000" y="1692000"/>
-            <a:ext cx="2231280" cy="409320"/>
+            <a:ext cx="2230560" cy="409320"/>
           </a:xfrm>
           <a:prstGeom prst="rect">
             <a:avLst/>
@@ -2867,14 +2635,14 @@
       </p:sp>
       <p:sp>
         <p:nvSpPr>
-          <p:cNvPr id="53" name="CustomShape 8"/>
+          <p:cNvPr id="49" name="CustomShape 8"/>
           <p:cNvSpPr/>
           <p:nvPr/>
         </p:nvSpPr>
         <p:spPr>
           <a:xfrm>
             <a:off x="72000" y="1337760"/>
-            <a:ext cx="2121120" cy="1549800"/>
+            <a:ext cx="2120400" cy="1261800"/>
           </a:xfrm>
           <a:prstGeom prst="rect">
             <a:avLst/>
@@ -2902,7 +2670,7 @@
               <a:buNone/>
             </a:pPr>
             <a:r>
-              <a:rPr b="0" lang="en-US" sz="800" spc="-1" strike="noStrike">
+              <a:rPr b="0" lang="en-US" sz="700" spc="-1" strike="noStrike">
                 <a:solidFill>
                   <a:srgbClr val="000000"/>
                 </a:solidFill>
@@ -2912,7 +2680,7 @@
               <a:t>Data can be imported from a </a:t>
             </a:r>
             <a:r>
-              <a:rPr b="1" lang="en-US" sz="800" spc="-1" strike="noStrike">
+              <a:rPr b="1" lang="en-US" sz="700" spc="-1" strike="noStrike">
                 <a:solidFill>
                   <a:srgbClr val="000000"/>
                 </a:solidFill>
@@ -2922,7 +2690,7 @@
               <a:t>.txt file</a:t>
             </a:r>
             <a:r>
-              <a:rPr b="0" lang="en-US" sz="800" spc="-1" strike="noStrike">
+              <a:rPr b="0" lang="en-US" sz="700" spc="-1" strike="noStrike">
                 <a:solidFill>
                   <a:srgbClr val="000000"/>
                 </a:solidFill>
@@ -2931,7 +2699,7 @@
               </a:rPr>
               <a:t> containing one row per item after a first row giving the doses or concentrations for each sample, with the first column corresponding to the identifier of each item. </a:t>
             </a:r>
-            <a:endParaRPr b="0" lang="fr-FR" sz="800" spc="-1" strike="noStrike">
+            <a:endParaRPr b="0" lang="fr-FR" sz="700" spc="-1" strike="noStrike">
               <a:latin typeface="Arial"/>
             </a:endParaRPr>
           </a:p>
@@ -2943,7 +2711,7 @@
               <a:buNone/>
             </a:pPr>
             <a:r>
-              <a:rPr b="0" lang="en-US" sz="800" spc="-1" strike="noStrike">
+              <a:rPr b="0" lang="en-US" sz="700" spc="-1" strike="noStrike">
                 <a:solidFill>
                   <a:srgbClr val="000000"/>
                 </a:solidFill>
@@ -2953,7 +2721,7 @@
               <a:t>Alternatively an R object of class </a:t>
             </a:r>
             <a:r>
-              <a:rPr b="1" lang="en-US" sz="800" spc="-1" strike="noStrike">
+              <a:rPr b="1" lang="en-US" sz="700" spc="-1" strike="noStrike">
                 <a:solidFill>
                   <a:srgbClr val="000000"/>
                 </a:solidFill>
@@ -2963,7 +2731,7 @@
               <a:t>data.frame </a:t>
             </a:r>
             <a:r>
-              <a:rPr b="0" lang="en-US" sz="800" spc="-1" strike="noStrike">
+              <a:rPr b="0" lang="en-US" sz="700" spc="-1" strike="noStrike">
                 <a:solidFill>
                   <a:srgbClr val="000000"/>
                 </a:solidFill>
@@ -2983,7 +2751,7 @@
               <a:t>read.table(file, header = FALSE)</a:t>
             </a:r>
             <a:r>
-              <a:rPr b="0" lang="en-US" sz="800" spc="-1" strike="noStrike">
+              <a:rPr b="0" lang="en-US" sz="700" spc="-1" strike="noStrike">
                 <a:solidFill>
                   <a:srgbClr val="000000"/>
                 </a:solidFill>
@@ -3003,7 +2771,7 @@
               <a:t>formatdata4DRomics()</a:t>
             </a:r>
             <a:r>
-              <a:rPr b="0" lang="en-US" sz="800" spc="-1" strike="noStrike">
+              <a:rPr b="0" lang="en-US" sz="700" spc="-1" strike="noStrike">
                 <a:solidFill>
                   <a:srgbClr val="000000"/>
                 </a:solidFill>
@@ -3012,22 +2780,22 @@
               </a:rPr>
               <a:t> can be used to help formatting such an R object.</a:t>
             </a:r>
-            <a:endParaRPr b="0" lang="fr-FR" sz="800" spc="-1" strike="noStrike">
-              <a:latin typeface="Arial"/>
-            </a:endParaRPr>
-          </a:p>
-        </p:txBody>
-      </p:sp>
-      <p:sp>
-        <p:nvSpPr>
-          <p:cNvPr id="54" name="CustomShape 9"/>
+            <a:endParaRPr b="0" lang="fr-FR" sz="700" spc="-1" strike="noStrike">
+              <a:latin typeface="Arial"/>
+            </a:endParaRPr>
+          </a:p>
+        </p:txBody>
+      </p:sp>
+      <p:sp>
+        <p:nvSpPr>
+          <p:cNvPr id="50" name="CustomShape 9"/>
           <p:cNvSpPr/>
           <p:nvPr/>
         </p:nvSpPr>
         <p:spPr>
           <a:xfrm>
             <a:off x="6876000" y="5076000"/>
-            <a:ext cx="2231280" cy="515880"/>
+            <a:ext cx="2230560" cy="515880"/>
           </a:xfrm>
           <a:prstGeom prst="rect">
             <a:avLst/>
@@ -3072,14 +2840,14 @@
       </p:sp>
       <p:sp>
         <p:nvSpPr>
-          <p:cNvPr id="55" name="CustomShape 10"/>
+          <p:cNvPr id="51" name="CustomShape 10"/>
           <p:cNvSpPr/>
           <p:nvPr/>
         </p:nvSpPr>
         <p:spPr>
           <a:xfrm>
-            <a:off x="108000" y="2968200"/>
-            <a:ext cx="4390560" cy="250560"/>
+            <a:off x="108000" y="2896200"/>
+            <a:ext cx="4389840" cy="249840"/>
           </a:xfrm>
           <a:prstGeom prst="roundRect">
             <a:avLst>
@@ -3136,14 +2904,14 @@
       </p:sp>
       <p:sp>
         <p:nvSpPr>
-          <p:cNvPr id="56" name="CustomShape 11"/>
+          <p:cNvPr id="52" name="CustomShape 11"/>
           <p:cNvSpPr/>
           <p:nvPr/>
         </p:nvSpPr>
         <p:spPr>
           <a:xfrm>
             <a:off x="4572000" y="5292000"/>
-            <a:ext cx="2231280" cy="196200"/>
+            <a:ext cx="2230560" cy="196200"/>
           </a:xfrm>
           <a:prstGeom prst="rect">
             <a:avLst/>
@@ -3186,85 +2954,16 @@
           </a:p>
         </p:txBody>
       </p:sp>
-      <p:pic>
-        <p:nvPicPr>
-          <p:cNvPr id="57" name="Image 47" descr=""/>
-          <p:cNvPicPr/>
-          <p:nvPr/>
-        </p:nvPicPr>
-        <p:blipFill>
-          <a:blip r:embed="rId3"/>
-          <a:stretch/>
-        </p:blipFill>
-        <p:spPr>
-          <a:xfrm>
-            <a:off x="6876000" y="1420560"/>
-            <a:ext cx="2231280" cy="1266480"/>
-          </a:xfrm>
-          <a:prstGeom prst="rect">
-            <a:avLst/>
-          </a:prstGeom>
-          <a:ln w="0">
-            <a:noFill/>
-          </a:ln>
-        </p:spPr>
-      </p:pic>
-      <p:pic>
-        <p:nvPicPr>
-          <p:cNvPr id="58" name="Image 87" descr=""/>
-          <p:cNvPicPr/>
-          <p:nvPr/>
-        </p:nvPicPr>
-        <p:blipFill>
-          <a:blip r:embed="rId4"/>
-          <a:stretch/>
-        </p:blipFill>
-        <p:spPr>
-          <a:xfrm>
-            <a:off x="4572000" y="5659200"/>
-            <a:ext cx="2231280" cy="1104480"/>
-          </a:xfrm>
-          <a:prstGeom prst="rect">
-            <a:avLst/>
-          </a:prstGeom>
-          <a:ln w="0">
-            <a:noFill/>
-          </a:ln>
-        </p:spPr>
-      </p:pic>
-      <p:pic>
-        <p:nvPicPr>
-          <p:cNvPr id="59" name="Image 91" descr=""/>
-          <p:cNvPicPr/>
-          <p:nvPr/>
-        </p:nvPicPr>
-        <p:blipFill>
-          <a:blip r:embed="rId5"/>
-          <a:stretch/>
-        </p:blipFill>
-        <p:spPr>
-          <a:xfrm>
-            <a:off x="4572000" y="3183480"/>
-            <a:ext cx="2231280" cy="1853280"/>
-          </a:xfrm>
-          <a:prstGeom prst="rect">
-            <a:avLst/>
-          </a:prstGeom>
-          <a:ln w="0">
-            <a:noFill/>
-          </a:ln>
-        </p:spPr>
-      </p:pic>
-      <p:sp>
-        <p:nvSpPr>
-          <p:cNvPr id="60" name="CustomShape 12"/>
+      <p:sp>
+        <p:nvSpPr>
+          <p:cNvPr id="53" name="CustomShape 12"/>
           <p:cNvSpPr/>
           <p:nvPr/>
         </p:nvSpPr>
         <p:spPr>
           <a:xfrm>
-            <a:off x="108000" y="6012000"/>
-            <a:ext cx="1690560" cy="718560"/>
+            <a:off x="108000" y="5940000"/>
+            <a:ext cx="1689840" cy="827640"/>
           </a:xfrm>
           <a:custGeom>
             <a:avLst/>
@@ -3413,14 +3112,14 @@
               <a:buNone/>
             </a:pPr>
             <a:r>
-              <a:rPr b="0" lang="en-US" sz="700" spc="-1" strike="noStrike">
+              <a:rPr b="0" lang="fr-FR" sz="700" spc="-1" strike="noStrike">
                 <a:solidFill>
                   <a:srgbClr val="000000"/>
                 </a:solidFill>
                 <a:latin typeface="Lucida Console"/>
                 <a:ea typeface="DejaVu Sans"/>
               </a:rPr>
-              <a:t>s &lt;- itemselect(o)</a:t>
+              <a:t>PCAdataplot(o)</a:t>
             </a:r>
             <a:endParaRPr b="0" lang="fr-FR" sz="700" spc="-1" strike="noStrike">
               <a:latin typeface="Arial"/>
@@ -3441,7 +3140,7 @@
                 <a:latin typeface="Lucida Console"/>
                 <a:ea typeface="DejaVu Sans"/>
               </a:rPr>
-              <a:t>f &lt;- drcfit(s)</a:t>
+              <a:t>s &lt;- itemselect(o)</a:t>
             </a:r>
             <a:endParaRPr b="0" lang="fr-FR" sz="700" spc="-1" strike="noStrike">
               <a:latin typeface="Arial"/>
@@ -3462,7 +3161,7 @@
                 <a:latin typeface="Lucida Console"/>
                 <a:ea typeface="DejaVu Sans"/>
               </a:rPr>
-              <a:t>r &lt;- bmdcalc(f)</a:t>
+              <a:t>f &lt;- drcfit(s)</a:t>
             </a:r>
             <a:endParaRPr b="0" lang="fr-FR" sz="700" spc="-1" strike="noStrike">
               <a:latin typeface="Arial"/>
@@ -3483,7 +3182,7 @@
                 <a:latin typeface="Lucida Console"/>
                 <a:ea typeface="DejaVu Sans"/>
               </a:rPr>
-              <a:t>b &lt;- bmdboot(r)</a:t>
+              <a:t>r &lt;- bmdcalc(f)</a:t>
             </a:r>
             <a:endParaRPr b="0" lang="fr-FR" sz="700" spc="-1" strike="noStrike">
               <a:latin typeface="Arial"/>
@@ -3504,6 +3203,27 @@
                 <a:latin typeface="Lucida Console"/>
                 <a:ea typeface="DejaVu Sans"/>
               </a:rPr>
+              <a:t>b &lt;- bmdboot(r)</a:t>
+            </a:r>
+            <a:endParaRPr b="0" lang="fr-FR" sz="700" spc="-1" strike="noStrike">
+              <a:latin typeface="Arial"/>
+            </a:endParaRPr>
+          </a:p>
+          <a:p>
+            <a:pPr>
+              <a:lnSpc>
+                <a:spcPct val="100000"/>
+              </a:lnSpc>
+              <a:buNone/>
+            </a:pPr>
+            <a:r>
+              <a:rPr b="0" lang="en-US" sz="700" spc="-1" strike="noStrike">
+                <a:solidFill>
+                  <a:srgbClr val="000000"/>
+                </a:solidFill>
+                <a:latin typeface="Lucida Console"/>
+                <a:ea typeface="DejaVu Sans"/>
+              </a:rPr>
               <a:t>b$res</a:t>
             </a:r>
             <a:endParaRPr b="0" lang="fr-FR" sz="700" spc="-1" strike="noStrike">
@@ -3514,14 +3234,14 @@
       </p:sp>
       <p:sp>
         <p:nvSpPr>
-          <p:cNvPr id="61" name="CustomShape 13"/>
+          <p:cNvPr id="54" name="CustomShape 13"/>
           <p:cNvSpPr/>
           <p:nvPr/>
         </p:nvSpPr>
         <p:spPr>
           <a:xfrm>
-            <a:off x="108000" y="5688000"/>
-            <a:ext cx="4390560" cy="250560"/>
+            <a:off x="108000" y="5616000"/>
+            <a:ext cx="4389840" cy="249840"/>
           </a:xfrm>
           <a:custGeom>
             <a:avLst/>
@@ -3665,14 +3385,14 @@
       </p:sp>
       <p:sp>
         <p:nvSpPr>
-          <p:cNvPr id="62" name="CustomShape 14"/>
+          <p:cNvPr id="55" name="CustomShape 14"/>
           <p:cNvSpPr/>
           <p:nvPr/>
         </p:nvSpPr>
         <p:spPr>
           <a:xfrm>
-            <a:off x="72000" y="3240000"/>
-            <a:ext cx="4498560" cy="2410560"/>
+            <a:off x="72000" y="3168000"/>
+            <a:ext cx="4497840" cy="2409840"/>
           </a:xfrm>
           <a:prstGeom prst="rect">
             <a:avLst/>
@@ -3700,7 +3420,7 @@
               <a:buNone/>
             </a:pPr>
             <a:r>
-              <a:rPr b="0" lang="fr-FR" sz="800" spc="-1" strike="noStrike">
+              <a:rPr b="0" lang="fr-FR" sz="700" spc="-1" strike="noStrike">
                 <a:solidFill>
                   <a:srgbClr val="000000"/>
                 </a:solidFill>
@@ -3709,7 +3429,7 @@
               </a:rPr>
               <a:t>See below the functions with their main arguments (see help pages for their complete description).</a:t>
             </a:r>
-            <a:endParaRPr b="0" lang="fr-FR" sz="800" spc="-1" strike="noStrike">
+            <a:endParaRPr b="0" lang="fr-FR" sz="700" spc="-1" strike="noStrike">
               <a:latin typeface="Arial"/>
             </a:endParaRPr>
           </a:p>
@@ -3720,7 +3440,7 @@
               </a:lnSpc>
               <a:buNone/>
             </a:pPr>
-            <a:endParaRPr b="0" lang="fr-FR" sz="800" spc="-1" strike="noStrike">
+            <a:endParaRPr b="0" lang="fr-FR" sz="700" spc="-1" strike="noStrike">
               <a:latin typeface="Arial"/>
             </a:endParaRPr>
           </a:p>
@@ -3732,7 +3452,7 @@
               <a:buNone/>
             </a:pPr>
             <a:r>
-              <a:rPr b="1" lang="fr-FR" sz="800" spc="-1" strike="noStrike">
+              <a:rPr b="1" lang="fr-FR" sz="700" spc="-1" strike="noStrike">
                 <a:solidFill>
                   <a:srgbClr val="000000"/>
                 </a:solidFill>
@@ -3741,7 +3461,7 @@
               </a:rPr>
               <a:t>Step 1: import, check and pretreatment</a:t>
             </a:r>
-            <a:endParaRPr b="0" lang="fr-FR" sz="800" spc="-1" strike="noStrike">
+            <a:endParaRPr b="0" lang="fr-FR" sz="700" spc="-1" strike="noStrike">
               <a:latin typeface="Arial"/>
             </a:endParaRPr>
           </a:p>
@@ -3836,7 +3556,7 @@
               </a:lnSpc>
               <a:buNone/>
             </a:pPr>
-            <a:endParaRPr b="0" lang="fr-FR" sz="700" spc="-1" strike="noStrike">
+            <a:endParaRPr b="0" lang="fr-FR" sz="400" spc="-1" strike="noStrike">
               <a:latin typeface="Arial"/>
             </a:endParaRPr>
           </a:p>
@@ -3848,16 +3568,16 @@
               <a:buNone/>
             </a:pPr>
             <a:r>
-              <a:rPr b="1" lang="fr-FR" sz="800" spc="-1" strike="noStrike">
-                <a:solidFill>
-                  <a:srgbClr val="000000"/>
-                </a:solidFill>
-                <a:latin typeface="Barlow"/>
-                <a:ea typeface="DejaVu Sans"/>
-              </a:rPr>
-              <a:t>Step 2: selection of significantly responsive items</a:t>
-            </a:r>
-            <a:endParaRPr b="0" lang="fr-FR" sz="800" spc="-1" strike="noStrike">
+              <a:rPr b="0" lang="fr-FR" sz="700" spc="-1" strike="noStrike">
+                <a:solidFill>
+                  <a:srgbClr val="000000"/>
+                </a:solidFill>
+                <a:latin typeface="Lucida Console"/>
+                <a:ea typeface="DejaVu Sans"/>
+              </a:rPr>
+              <a:t>PCAdataplot(omicdata, batch, label)</a:t>
+            </a:r>
+            <a:endParaRPr b="0" lang="fr-FR" sz="700" spc="-1" strike="noStrike">
               <a:latin typeface="Arial"/>
             </a:endParaRPr>
           </a:p>
@@ -3868,17 +3588,7 @@
               </a:lnSpc>
               <a:buNone/>
             </a:pPr>
-            <a:r>
-              <a:rPr b="0" lang="fr-FR" sz="700" spc="-1" strike="noStrike">
-                <a:solidFill>
-                  <a:srgbClr val="000000"/>
-                </a:solidFill>
-                <a:latin typeface="Lucida Console"/>
-                <a:ea typeface="DejaVu Sans"/>
-              </a:rPr>
-              <a:t>itemselect(omicdata, select.method = c("quadratic", "linear", "ANOVA"), </a:t>
-            </a:r>
-            <a:endParaRPr b="0" lang="fr-FR" sz="700" spc="-1" strike="noStrike">
+            <a:endParaRPr b="0" lang="fr-FR" sz="400" spc="-1" strike="noStrike">
               <a:latin typeface="Arial"/>
             </a:endParaRPr>
           </a:p>
@@ -3890,24 +3600,14 @@
               <a:buNone/>
             </a:pPr>
             <a:r>
-              <a:rPr b="0" lang="fr-FR" sz="700" spc="-1" strike="noStrike">
-                <a:solidFill>
-                  <a:srgbClr val="000000"/>
-                </a:solidFill>
-                <a:latin typeface="Lucida Console"/>
-                <a:ea typeface="DejaVu Sans"/>
-              </a:rPr>
-              <a:t>  </a:t>
-            </a:r>
-            <a:r>
-              <a:rPr b="0" lang="fr-FR" sz="700" spc="-1" strike="noStrike">
-                <a:solidFill>
-                  <a:srgbClr val="000000"/>
-                </a:solidFill>
-                <a:latin typeface="Lucida Console"/>
-                <a:ea typeface="DejaVu Sans"/>
-              </a:rPr>
-              <a:t>FDR = 0.05)</a:t>
+              <a:rPr b="1" lang="fr-FR" sz="700" spc="-1" strike="noStrike">
+                <a:solidFill>
+                  <a:srgbClr val="000000"/>
+                </a:solidFill>
+                <a:latin typeface="Barlow"/>
+                <a:ea typeface="DejaVu Sans"/>
+              </a:rPr>
+              <a:t>Step 2: selection of significantly responsive items</a:t>
             </a:r>
             <a:endParaRPr b="0" lang="fr-FR" sz="700" spc="-1" strike="noStrike">
               <a:latin typeface="Arial"/>
@@ -3920,6 +3620,16 @@
               </a:lnSpc>
               <a:buNone/>
             </a:pPr>
+            <a:r>
+              <a:rPr b="0" lang="fr-FR" sz="700" spc="-1" strike="noStrike">
+                <a:solidFill>
+                  <a:srgbClr val="000000"/>
+                </a:solidFill>
+                <a:latin typeface="Lucida Console"/>
+                <a:ea typeface="DejaVu Sans"/>
+              </a:rPr>
+              <a:t>itemselect(omicdata, select.method = c("quadratic", "linear", "ANOVA"), </a:t>
+            </a:r>
             <a:endParaRPr b="0" lang="fr-FR" sz="700" spc="-1" strike="noStrike">
               <a:latin typeface="Arial"/>
             </a:endParaRPr>
@@ -3932,16 +3642,26 @@
               <a:buNone/>
             </a:pPr>
             <a:r>
-              <a:rPr b="1" lang="fr-FR" sz="800" spc="-1" strike="noStrike">
-                <a:solidFill>
-                  <a:srgbClr val="000000"/>
-                </a:solidFill>
-                <a:latin typeface="Barlow"/>
-                <a:ea typeface="DejaVu Sans"/>
-              </a:rPr>
-              <a:t>Step 3: dose-response modelling for responsive items</a:t>
-            </a:r>
-            <a:endParaRPr b="0" lang="fr-FR" sz="800" spc="-1" strike="noStrike">
+              <a:rPr b="0" lang="fr-FR" sz="700" spc="-1" strike="noStrike">
+                <a:solidFill>
+                  <a:srgbClr val="000000"/>
+                </a:solidFill>
+                <a:latin typeface="Lucida Console"/>
+                <a:ea typeface="DejaVu Sans"/>
+              </a:rPr>
+              <a:t>  </a:t>
+            </a:r>
+            <a:r>
+              <a:rPr b="0" lang="fr-FR" sz="700" spc="-1" strike="noStrike">
+                <a:solidFill>
+                  <a:srgbClr val="000000"/>
+                </a:solidFill>
+                <a:latin typeface="Lucida Console"/>
+                <a:ea typeface="DejaVu Sans"/>
+              </a:rPr>
+              <a:t>FDR = 0.05)</a:t>
+            </a:r>
+            <a:endParaRPr b="0" lang="fr-FR" sz="700" spc="-1" strike="noStrike">
               <a:latin typeface="Arial"/>
             </a:endParaRPr>
           </a:p>
@@ -3952,17 +3672,7 @@
               </a:lnSpc>
               <a:buNone/>
             </a:pPr>
-            <a:r>
-              <a:rPr b="0" lang="fr-FR" sz="700" spc="-1" strike="noStrike">
-                <a:solidFill>
-                  <a:srgbClr val="000000"/>
-                </a:solidFill>
-                <a:latin typeface="Lucida Console"/>
-                <a:ea typeface="DejaVu Sans"/>
-              </a:rPr>
-              <a:t>drcfit(itemselect, information.criterion = c("AICc", "BIC", "AIC"))</a:t>
-            </a:r>
-            <a:endParaRPr b="0" lang="fr-FR" sz="700" spc="-1" strike="noStrike">
+            <a:endParaRPr b="0" lang="fr-FR" sz="400" spc="-1" strike="noStrike">
               <a:latin typeface="Arial"/>
             </a:endParaRPr>
           </a:p>
@@ -3973,6 +3683,16 @@
               </a:lnSpc>
               <a:buNone/>
             </a:pPr>
+            <a:r>
+              <a:rPr b="1" lang="fr-FR" sz="700" spc="-1" strike="noStrike">
+                <a:solidFill>
+                  <a:srgbClr val="000000"/>
+                </a:solidFill>
+                <a:latin typeface="Barlow"/>
+                <a:ea typeface="DejaVu Sans"/>
+              </a:rPr>
+              <a:t>Step 3: dose-response modelling for responsive items</a:t>
+            </a:r>
             <a:endParaRPr b="0" lang="fr-FR" sz="700" spc="-1" strike="noStrike">
               <a:latin typeface="Arial"/>
             </a:endParaRPr>
@@ -3985,16 +3705,16 @@
               <a:buNone/>
             </a:pPr>
             <a:r>
-              <a:rPr b="1" lang="fr-FR" sz="800" spc="-1" strike="noStrike">
-                <a:solidFill>
-                  <a:srgbClr val="000000"/>
-                </a:solidFill>
-                <a:latin typeface="Barlow"/>
-                <a:ea typeface="DejaVu Sans"/>
-              </a:rPr>
-              <a:t>Step 4: Computation of benchmark doses</a:t>
-            </a:r>
-            <a:endParaRPr b="0" lang="fr-FR" sz="800" spc="-1" strike="noStrike">
+              <a:rPr b="0" lang="fr-FR" sz="700" spc="-1" strike="noStrike">
+                <a:solidFill>
+                  <a:srgbClr val="000000"/>
+                </a:solidFill>
+                <a:latin typeface="Lucida Console"/>
+                <a:ea typeface="DejaVu Sans"/>
+              </a:rPr>
+              <a:t>drcfit(itemselect, information.criterion = c("AICc", "BIC", "AIC"))</a:t>
+            </a:r>
+            <a:endParaRPr b="0" lang="fr-FR" sz="700" spc="-1" strike="noStrike">
               <a:latin typeface="Arial"/>
             </a:endParaRPr>
           </a:p>
@@ -4005,17 +3725,7 @@
               </a:lnSpc>
               <a:buNone/>
             </a:pPr>
-            <a:r>
-              <a:rPr b="0" lang="fr-FR" sz="700" spc="-1" strike="noStrike">
-                <a:solidFill>
-                  <a:srgbClr val="000000"/>
-                </a:solidFill>
-                <a:latin typeface="Lucida Console"/>
-                <a:ea typeface="DejaVu Sans"/>
-              </a:rPr>
-              <a:t>bmdcalc(f, z = 1, x = 10)</a:t>
-            </a:r>
-            <a:endParaRPr b="0" lang="fr-FR" sz="700" spc="-1" strike="noStrike">
+            <a:endParaRPr b="0" lang="fr-FR" sz="400" spc="-1" strike="noStrike">
               <a:latin typeface="Arial"/>
             </a:endParaRPr>
           </a:p>
@@ -4026,6 +3736,16 @@
               </a:lnSpc>
               <a:buNone/>
             </a:pPr>
+            <a:r>
+              <a:rPr b="1" lang="fr-FR" sz="700" spc="-1" strike="noStrike">
+                <a:solidFill>
+                  <a:srgbClr val="000000"/>
+                </a:solidFill>
+                <a:latin typeface="Barlow"/>
+                <a:ea typeface="DejaVu Sans"/>
+              </a:rPr>
+              <a:t>Step 4: computation of benchmark doses</a:t>
+            </a:r>
             <a:endParaRPr b="0" lang="fr-FR" sz="700" spc="-1" strike="noStrike">
               <a:latin typeface="Arial"/>
             </a:endParaRPr>
@@ -4038,16 +3758,16 @@
               <a:buNone/>
             </a:pPr>
             <a:r>
-              <a:rPr b="1" lang="fr-FR" sz="800" spc="-1" strike="noStrike">
-                <a:solidFill>
-                  <a:srgbClr val="000000"/>
-                </a:solidFill>
-                <a:latin typeface="Barlow"/>
-                <a:ea typeface="DejaVu Sans"/>
-              </a:rPr>
-              <a:t>Step 5: Bootstrap to compute BMD confidence intervals</a:t>
-            </a:r>
-            <a:endParaRPr b="0" lang="fr-FR" sz="800" spc="-1" strike="noStrike">
+              <a:rPr b="0" lang="fr-FR" sz="700" spc="-1" strike="noStrike">
+                <a:solidFill>
+                  <a:srgbClr val="000000"/>
+                </a:solidFill>
+                <a:latin typeface="Lucida Console"/>
+                <a:ea typeface="DejaVu Sans"/>
+              </a:rPr>
+              <a:t>bmdcalc(f, z = 1, x = 10)</a:t>
+            </a:r>
+            <a:endParaRPr b="0" lang="fr-FR" sz="700" spc="-1" strike="noStrike">
               <a:latin typeface="Arial"/>
             </a:endParaRPr>
           </a:p>
@@ -4058,6 +3778,38 @@
               </a:lnSpc>
               <a:buNone/>
             </a:pPr>
+            <a:endParaRPr b="0" lang="fr-FR" sz="400" spc="-1" strike="noStrike">
+              <a:latin typeface="Arial"/>
+            </a:endParaRPr>
+          </a:p>
+          <a:p>
+            <a:pPr>
+              <a:lnSpc>
+                <a:spcPct val="100000"/>
+              </a:lnSpc>
+              <a:buNone/>
+            </a:pPr>
+            <a:r>
+              <a:rPr b="1" lang="fr-FR" sz="700" spc="-1" strike="noStrike">
+                <a:solidFill>
+                  <a:srgbClr val="000000"/>
+                </a:solidFill>
+                <a:latin typeface="Barlow"/>
+                <a:ea typeface="DejaVu Sans"/>
+              </a:rPr>
+              <a:t>Step 5: bootstrap to compute BMD confidence intervals</a:t>
+            </a:r>
+            <a:endParaRPr b="0" lang="fr-FR" sz="700" spc="-1" strike="noStrike">
+              <a:latin typeface="Arial"/>
+            </a:endParaRPr>
+          </a:p>
+          <a:p>
+            <a:pPr>
+              <a:lnSpc>
+                <a:spcPct val="100000"/>
+              </a:lnSpc>
+              <a:buNone/>
+            </a:pPr>
             <a:r>
               <a:rPr b="0" lang="fr-FR" sz="700" spc="-1" strike="noStrike">
                 <a:solidFill>
@@ -4076,14 +3828,14 @@
       </p:sp>
       <p:sp>
         <p:nvSpPr>
-          <p:cNvPr id="63" name="CustomShape 15"/>
+          <p:cNvPr id="56" name="CustomShape 15"/>
           <p:cNvSpPr/>
           <p:nvPr/>
         </p:nvSpPr>
         <p:spPr>
           <a:xfrm>
             <a:off x="1440000" y="908280"/>
-            <a:ext cx="3058560" cy="250560"/>
+            <a:ext cx="3057840" cy="249840"/>
           </a:xfrm>
           <a:prstGeom prst="roundRect">
             <a:avLst>
@@ -4143,14 +3895,14 @@
       </p:sp>
       <p:sp>
         <p:nvSpPr>
-          <p:cNvPr id="64" name="CustomShape 16"/>
+          <p:cNvPr id="57" name="CustomShape 16"/>
           <p:cNvSpPr/>
           <p:nvPr/>
         </p:nvSpPr>
         <p:spPr>
           <a:xfrm>
             <a:off x="6948000" y="2743560"/>
-            <a:ext cx="2086920" cy="250560"/>
+            <a:ext cx="2086200" cy="249840"/>
           </a:xfrm>
           <a:prstGeom prst="roundRect">
             <a:avLst>
@@ -4207,14 +3959,14 @@
       </p:sp>
       <p:sp>
         <p:nvSpPr>
-          <p:cNvPr id="65" name="CustomShape 17"/>
+          <p:cNvPr id="58" name="CustomShape 17"/>
           <p:cNvSpPr/>
           <p:nvPr/>
         </p:nvSpPr>
         <p:spPr>
           <a:xfrm>
             <a:off x="4644000" y="2340360"/>
-            <a:ext cx="2086920" cy="250560"/>
+            <a:ext cx="2086200" cy="249840"/>
           </a:xfrm>
           <a:prstGeom prst="roundRect">
             <a:avLst>
@@ -4271,14 +4023,14 @@
       </p:sp>
       <p:sp>
         <p:nvSpPr>
-          <p:cNvPr id="66" name="CustomShape 18"/>
+          <p:cNvPr id="59" name="CustomShape 18"/>
           <p:cNvSpPr/>
           <p:nvPr/>
         </p:nvSpPr>
         <p:spPr>
           <a:xfrm>
             <a:off x="4644000" y="5040360"/>
-            <a:ext cx="2086920" cy="250560"/>
+            <a:ext cx="2086200" cy="249840"/>
           </a:xfrm>
           <a:prstGeom prst="roundRect">
             <a:avLst>
@@ -4335,14 +4087,14 @@
       </p:sp>
       <p:sp>
         <p:nvSpPr>
-          <p:cNvPr id="67" name="CustomShape 19"/>
+          <p:cNvPr id="60" name="CustomShape 19"/>
           <p:cNvSpPr/>
           <p:nvPr/>
         </p:nvSpPr>
         <p:spPr>
           <a:xfrm>
             <a:off x="6948000" y="4824360"/>
-            <a:ext cx="2086920" cy="250560"/>
+            <a:ext cx="2086200" cy="249840"/>
           </a:xfrm>
           <a:prstGeom prst="roundRect">
             <a:avLst>
@@ -4399,14 +4151,14 @@
       </p:sp>
       <p:sp>
         <p:nvSpPr>
-          <p:cNvPr id="68" name="CustomShape 20"/>
+          <p:cNvPr id="61" name="CustomShape 20"/>
           <p:cNvSpPr/>
           <p:nvPr/>
         </p:nvSpPr>
         <p:spPr>
           <a:xfrm>
             <a:off x="4644000" y="1456560"/>
-            <a:ext cx="2086920" cy="250560"/>
+            <a:ext cx="2086200" cy="249840"/>
           </a:xfrm>
           <a:prstGeom prst="roundRect">
             <a:avLst>
@@ -4463,14 +4215,14 @@
       </p:sp>
       <p:sp>
         <p:nvSpPr>
-          <p:cNvPr id="69" name="CustomShape 21"/>
+          <p:cNvPr id="62" name="CustomShape 21"/>
           <p:cNvSpPr/>
           <p:nvPr/>
         </p:nvSpPr>
         <p:spPr>
           <a:xfrm>
             <a:off x="4644000" y="72000"/>
-            <a:ext cx="4390560" cy="502560"/>
+            <a:ext cx="4389840" cy="501840"/>
           </a:xfrm>
           <a:custGeom>
             <a:avLst/>
@@ -4614,18 +4366,18 @@
       </p:sp>
       <p:pic>
         <p:nvPicPr>
-          <p:cNvPr id="70" name="" descr=""/>
+          <p:cNvPr id="63" name="" descr=""/>
           <p:cNvPicPr/>
           <p:nvPr/>
         </p:nvPicPr>
         <p:blipFill>
-          <a:blip r:embed="rId6"/>
+          <a:blip r:embed="rId1"/>
           <a:stretch/>
         </p:blipFill>
         <p:spPr>
           <a:xfrm>
             <a:off x="252000" y="108000"/>
-            <a:ext cx="930960" cy="1078920"/>
+            <a:ext cx="930240" cy="1078200"/>
           </a:xfrm>
           <a:prstGeom prst="rect">
             <a:avLst/>
@@ -4637,33 +4389,33 @@
       </p:pic>
       <p:grpSp>
         <p:nvGrpSpPr>
-          <p:cNvPr id="71" name="Group 22"/>
+          <p:cNvPr id="64" name="Group 22"/>
           <p:cNvGrpSpPr/>
           <p:nvPr/>
         </p:nvGrpSpPr>
         <p:grpSpPr>
           <a:xfrm>
             <a:off x="2304000" y="1440000"/>
-            <a:ext cx="1434960" cy="1222560"/>
+            <a:ext cx="1434240" cy="1221840"/>
             <a:chOff x="2304000" y="1440000"/>
-            <a:chExt cx="1434960" cy="1222560"/>
+            <a:chExt cx="1434240" cy="1221840"/>
           </a:xfrm>
         </p:grpSpPr>
         <p:pic>
           <p:nvPicPr>
-            <p:cNvPr id="72" name="" descr=""/>
+            <p:cNvPr id="65" name="" descr=""/>
             <p:cNvPicPr/>
             <p:nvPr/>
           </p:nvPicPr>
           <p:blipFill>
-            <a:blip r:embed="rId7"/>
+            <a:blip r:embed="rId2"/>
             <a:srcRect l="0" t="0" r="51190" b="7048"/>
             <a:stretch/>
           </p:blipFill>
           <p:spPr>
             <a:xfrm>
               <a:off x="2304000" y="1440000"/>
-              <a:ext cx="1423800" cy="1186560"/>
+              <a:ext cx="1423080" cy="1185840"/>
             </a:xfrm>
             <a:prstGeom prst="rect">
               <a:avLst/>
@@ -4675,14 +4427,14 @@
         </p:pic>
         <p:sp>
           <p:nvSpPr>
-            <p:cNvPr id="73" name="CustomShape 23"/>
+            <p:cNvPr id="66" name="CustomShape 23"/>
             <p:cNvSpPr/>
             <p:nvPr/>
           </p:nvSpPr>
           <p:spPr>
             <a:xfrm>
               <a:off x="2311200" y="1440000"/>
-              <a:ext cx="1427760" cy="1222560"/>
+              <a:ext cx="1427040" cy="1221840"/>
             </a:xfrm>
             <a:prstGeom prst="rect">
               <a:avLst/>
@@ -4704,14 +4456,14 @@
         </p:sp>
         <p:sp>
           <p:nvSpPr>
-            <p:cNvPr id="74" name="CustomShape 24"/>
+            <p:cNvPr id="67" name="CustomShape 24"/>
             <p:cNvSpPr/>
             <p:nvPr/>
           </p:nvSpPr>
           <p:spPr>
             <a:xfrm>
               <a:off x="2750400" y="1548000"/>
-              <a:ext cx="988560" cy="1114560"/>
+              <a:ext cx="987840" cy="1113840"/>
             </a:xfrm>
             <a:prstGeom prst="rect">
               <a:avLst/>
@@ -4734,28 +4486,28 @@
       </p:grpSp>
       <p:grpSp>
         <p:nvGrpSpPr>
-          <p:cNvPr id="75" name="Group 25"/>
+          <p:cNvPr id="68" name="Group 25"/>
           <p:cNvGrpSpPr/>
           <p:nvPr/>
         </p:nvGrpSpPr>
         <p:grpSpPr>
           <a:xfrm>
             <a:off x="2376000" y="1189800"/>
-            <a:ext cx="2192400" cy="249840"/>
+            <a:ext cx="2191680" cy="249840"/>
             <a:chOff x="2376000" y="1189800"/>
-            <a:chExt cx="2192400" cy="249840"/>
+            <a:chExt cx="2191680" cy="249840"/>
           </a:xfrm>
         </p:grpSpPr>
         <p:sp>
           <p:nvSpPr>
-            <p:cNvPr id="76" name="CustomShape 26"/>
+            <p:cNvPr id="69" name="CustomShape 26"/>
             <p:cNvSpPr/>
             <p:nvPr/>
           </p:nvSpPr>
           <p:spPr>
             <a:xfrm>
               <a:off x="2376000" y="1189800"/>
-              <a:ext cx="2192400" cy="196200"/>
+              <a:ext cx="2191680" cy="196200"/>
             </a:xfrm>
             <a:prstGeom prst="rect">
               <a:avLst/>
@@ -4800,7 +4552,7 @@
         </p:sp>
         <p:sp>
           <p:nvSpPr>
-            <p:cNvPr id="77" name="Line 27"/>
+            <p:cNvPr id="70" name="Line 27"/>
             <p:cNvSpPr/>
             <p:nvPr/>
           </p:nvSpPr>
@@ -4829,7 +4581,7 @@
         </p:sp>
         <p:sp>
           <p:nvSpPr>
-            <p:cNvPr id="78" name="Line 28"/>
+            <p:cNvPr id="71" name="Line 28"/>
             <p:cNvSpPr/>
             <p:nvPr/>
           </p:nvSpPr>
@@ -4858,28 +4610,28 @@
       </p:grpSp>
       <p:grpSp>
         <p:nvGrpSpPr>
-          <p:cNvPr id="79" name="Group 29"/>
+          <p:cNvPr id="72" name="Group 29"/>
           <p:cNvGrpSpPr/>
           <p:nvPr/>
         </p:nvGrpSpPr>
         <p:grpSpPr>
           <a:xfrm>
             <a:off x="3743640" y="1474560"/>
-            <a:ext cx="790920" cy="396720"/>
+            <a:ext cx="790200" cy="396720"/>
             <a:chOff x="3743640" y="1474560"/>
-            <a:chExt cx="790920" cy="396720"/>
+            <a:chExt cx="790200" cy="396720"/>
           </a:xfrm>
         </p:grpSpPr>
         <p:sp>
           <p:nvSpPr>
-            <p:cNvPr id="80" name="CustomShape 30"/>
+            <p:cNvPr id="73" name="CustomShape 30"/>
             <p:cNvSpPr/>
             <p:nvPr/>
           </p:nvSpPr>
           <p:spPr>
             <a:xfrm>
               <a:off x="3743640" y="1568520"/>
-              <a:ext cx="790920" cy="302760"/>
+              <a:ext cx="790200" cy="302760"/>
             </a:xfrm>
             <a:prstGeom prst="rect">
               <a:avLst/>
@@ -4924,7 +4676,7 @@
         </p:sp>
         <p:sp>
           <p:nvSpPr>
-            <p:cNvPr id="81" name="Line 31"/>
+            <p:cNvPr id="74" name="Line 31"/>
             <p:cNvSpPr/>
             <p:nvPr/>
           </p:nvSpPr>
@@ -4953,7 +4705,7 @@
         </p:sp>
         <p:sp>
           <p:nvSpPr>
-            <p:cNvPr id="82" name="Line 32"/>
+            <p:cNvPr id="75" name="Line 32"/>
             <p:cNvSpPr/>
             <p:nvPr/>
           </p:nvSpPr>
@@ -4982,28 +4734,28 @@
       </p:grpSp>
       <p:grpSp>
         <p:nvGrpSpPr>
-          <p:cNvPr id="83" name="Group 33"/>
+          <p:cNvPr id="76" name="Group 33"/>
           <p:cNvGrpSpPr/>
           <p:nvPr/>
         </p:nvGrpSpPr>
         <p:grpSpPr>
           <a:xfrm>
-            <a:off x="2376000" y="2232000"/>
-            <a:ext cx="2196000" cy="647280"/>
-            <a:chOff x="2376000" y="2232000"/>
-            <a:chExt cx="2196000" cy="647280"/>
+            <a:off x="2376000" y="2196000"/>
+            <a:ext cx="2195280" cy="647280"/>
+            <a:chOff x="2376000" y="2196000"/>
+            <a:chExt cx="2195280" cy="647280"/>
           </a:xfrm>
         </p:grpSpPr>
         <p:sp>
           <p:nvSpPr>
-            <p:cNvPr id="84" name="CustomShape 34"/>
+            <p:cNvPr id="77" name="CustomShape 34"/>
             <p:cNvSpPr/>
             <p:nvPr/>
           </p:nvSpPr>
           <p:spPr>
             <a:xfrm>
-              <a:off x="2376000" y="2683080"/>
-              <a:ext cx="2196000" cy="196200"/>
+              <a:off x="2376000" y="2647080"/>
+              <a:ext cx="2195280" cy="196200"/>
             </a:xfrm>
             <a:prstGeom prst="rect">
               <a:avLst/>
@@ -5048,13 +4800,13 @@
         </p:sp>
         <p:sp>
           <p:nvSpPr>
-            <p:cNvPr id="85" name="Line 35"/>
+            <p:cNvPr id="78" name="Line 35"/>
             <p:cNvSpPr/>
             <p:nvPr/>
           </p:nvSpPr>
           <p:spPr>
             <a:xfrm flipH="1">
-              <a:off x="3747600" y="2232000"/>
+              <a:off x="3747600" y="2196000"/>
               <a:ext cx="136800" cy="360"/>
             </a:xfrm>
             <a:prstGeom prst="line">
@@ -5077,13 +4829,13 @@
         </p:sp>
         <p:sp>
           <p:nvSpPr>
-            <p:cNvPr id="86" name="Line 36"/>
+            <p:cNvPr id="79" name="Line 36"/>
             <p:cNvSpPr/>
             <p:nvPr/>
           </p:nvSpPr>
           <p:spPr>
             <a:xfrm>
-              <a:off x="3880800" y="2232000"/>
+              <a:off x="3880800" y="2196000"/>
               <a:ext cx="360" cy="504000"/>
             </a:xfrm>
             <a:prstGeom prst="line">
@@ -5104,6 +4856,121 @@
           </p:style>
         </p:sp>
       </p:grpSp>
+      <p:pic>
+        <p:nvPicPr>
+          <p:cNvPr id="80" name="" descr=""/>
+          <p:cNvPicPr/>
+          <p:nvPr/>
+        </p:nvPicPr>
+        <p:blipFill>
+          <a:blip r:embed="rId3"/>
+          <a:stretch/>
+        </p:blipFill>
+        <p:spPr>
+          <a:xfrm>
+            <a:off x="4572000" y="5587200"/>
+            <a:ext cx="2213640" cy="1104840"/>
+          </a:xfrm>
+          <a:prstGeom prst="rect">
+            <a:avLst/>
+          </a:prstGeom>
+          <a:ln w="0">
+            <a:noFill/>
+          </a:ln>
+        </p:spPr>
+      </p:pic>
+      <p:pic>
+        <p:nvPicPr>
+          <p:cNvPr id="81" name="" descr=""/>
+          <p:cNvPicPr/>
+          <p:nvPr/>
+        </p:nvPicPr>
+        <p:blipFill>
+          <a:blip r:embed="rId4"/>
+          <a:stretch/>
+        </p:blipFill>
+        <p:spPr>
+          <a:xfrm>
+            <a:off x="6876000" y="5623200"/>
+            <a:ext cx="2221200" cy="1108800"/>
+          </a:xfrm>
+          <a:prstGeom prst="rect">
+            <a:avLst/>
+          </a:prstGeom>
+          <a:ln w="0">
+            <a:noFill/>
+          </a:ln>
+        </p:spPr>
+      </p:pic>
+      <p:pic>
+        <p:nvPicPr>
+          <p:cNvPr id="82" name="" descr=""/>
+          <p:cNvPicPr/>
+          <p:nvPr/>
+        </p:nvPicPr>
+        <p:blipFill>
+          <a:blip r:embed="rId5"/>
+          <a:stretch/>
+        </p:blipFill>
+        <p:spPr>
+          <a:xfrm>
+            <a:off x="4572000" y="3110400"/>
+            <a:ext cx="2224800" cy="1854000"/>
+          </a:xfrm>
+          <a:prstGeom prst="rect">
+            <a:avLst/>
+          </a:prstGeom>
+          <a:ln w="0">
+            <a:noFill/>
+          </a:ln>
+        </p:spPr>
+      </p:pic>
+      <p:pic>
+        <p:nvPicPr>
+          <p:cNvPr id="83" name="" descr=""/>
+          <p:cNvPicPr/>
+          <p:nvPr/>
+        </p:nvPicPr>
+        <p:blipFill>
+          <a:blip r:embed="rId6"/>
+          <a:stretch/>
+        </p:blipFill>
+        <p:spPr>
+          <a:xfrm>
+            <a:off x="6876000" y="3409200"/>
+            <a:ext cx="2221200" cy="1267200"/>
+          </a:xfrm>
+          <a:prstGeom prst="rect">
+            <a:avLst/>
+          </a:prstGeom>
+          <a:ln w="0">
+            <a:noFill/>
+          </a:ln>
+        </p:spPr>
+      </p:pic>
+      <p:pic>
+        <p:nvPicPr>
+          <p:cNvPr id="84" name="" descr=""/>
+          <p:cNvPicPr/>
+          <p:nvPr/>
+        </p:nvPicPr>
+        <p:blipFill>
+          <a:blip r:embed="rId7"/>
+          <a:stretch/>
+        </p:blipFill>
+        <p:spPr>
+          <a:xfrm>
+            <a:off x="6876000" y="1422000"/>
+            <a:ext cx="2221200" cy="1267200"/>
+          </a:xfrm>
+          <a:prstGeom prst="rect">
+            <a:avLst/>
+          </a:prstGeom>
+          <a:ln w="0">
+            <a:noFill/>
+          </a:ln>
+        </p:spPr>
+      </p:pic>
     </p:spTree>
   </p:cSld>
   <mc:AlternateContent>

</xml_diff>